<commit_message>
added material of cloud and IS
</commit_message>
<xml_diff>
--- a/FAST-NUCES/semester VII/Professional Paractices in IT/Before-Mid-1/Lec-8 Investment Appraisal- Ch.8(a).pptx
+++ b/FAST-NUCES/semester VII/Professional Paractices in IT/Before-Mid-1/Lec-8 Investment Appraisal- Ch.8(a).pptx
@@ -319,7 +319,7 @@
             <a:fld id="{1D8BD707-D9CF-40AE-B4C6-C98DA3205C09}" type="datetimeFigureOut">
               <a:rPr lang="en-US" smtClean="0"/>
               <a:pPr/>
-              <a:t>9/10/2024</a:t>
+              <a:t>12/16/2024</a:t>
             </a:fld>
             <a:endParaRPr lang="en-US"/>
           </a:p>
@@ -484,7 +484,7 @@
             <a:fld id="{1D8BD707-D9CF-40AE-B4C6-C98DA3205C09}" type="datetimeFigureOut">
               <a:rPr lang="en-US" smtClean="0"/>
               <a:pPr/>
-              <a:t>9/10/2024</a:t>
+              <a:t>12/16/2024</a:t>
             </a:fld>
             <a:endParaRPr lang="en-US"/>
           </a:p>
@@ -659,7 +659,7 @@
             <a:fld id="{1D8BD707-D9CF-40AE-B4C6-C98DA3205C09}" type="datetimeFigureOut">
               <a:rPr lang="en-US" smtClean="0"/>
               <a:pPr/>
-              <a:t>9/10/2024</a:t>
+              <a:t>12/16/2024</a:t>
             </a:fld>
             <a:endParaRPr lang="en-US"/>
           </a:p>
@@ -824,7 +824,7 @@
             <a:fld id="{1D8BD707-D9CF-40AE-B4C6-C98DA3205C09}" type="datetimeFigureOut">
               <a:rPr lang="en-US" smtClean="0"/>
               <a:pPr/>
-              <a:t>9/10/2024</a:t>
+              <a:t>12/16/2024</a:t>
             </a:fld>
             <a:endParaRPr lang="en-US"/>
           </a:p>
@@ -1066,7 +1066,7 @@
             <a:fld id="{1D8BD707-D9CF-40AE-B4C6-C98DA3205C09}" type="datetimeFigureOut">
               <a:rPr lang="en-US" smtClean="0"/>
               <a:pPr/>
-              <a:t>9/10/2024</a:t>
+              <a:t>12/16/2024</a:t>
             </a:fld>
             <a:endParaRPr lang="en-US"/>
           </a:p>
@@ -1348,7 +1348,7 @@
             <a:fld id="{1D8BD707-D9CF-40AE-B4C6-C98DA3205C09}" type="datetimeFigureOut">
               <a:rPr lang="en-US" smtClean="0"/>
               <a:pPr/>
-              <a:t>9/10/2024</a:t>
+              <a:t>12/16/2024</a:t>
             </a:fld>
             <a:endParaRPr lang="en-US"/>
           </a:p>
@@ -1764,7 +1764,7 @@
             <a:fld id="{1D8BD707-D9CF-40AE-B4C6-C98DA3205C09}" type="datetimeFigureOut">
               <a:rPr lang="en-US" smtClean="0"/>
               <a:pPr/>
-              <a:t>9/10/2024</a:t>
+              <a:t>12/16/2024</a:t>
             </a:fld>
             <a:endParaRPr lang="en-US"/>
           </a:p>
@@ -1878,7 +1878,7 @@
             <a:fld id="{1D8BD707-D9CF-40AE-B4C6-C98DA3205C09}" type="datetimeFigureOut">
               <a:rPr lang="en-US" smtClean="0"/>
               <a:pPr/>
-              <a:t>9/10/2024</a:t>
+              <a:t>12/16/2024</a:t>
             </a:fld>
             <a:endParaRPr lang="en-US"/>
           </a:p>
@@ -1970,7 +1970,7 @@
             <a:fld id="{1D8BD707-D9CF-40AE-B4C6-C98DA3205C09}" type="datetimeFigureOut">
               <a:rPr lang="en-US" smtClean="0"/>
               <a:pPr/>
-              <a:t>9/10/2024</a:t>
+              <a:t>12/16/2024</a:t>
             </a:fld>
             <a:endParaRPr lang="en-US"/>
           </a:p>
@@ -2242,7 +2242,7 @@
             <a:fld id="{1D8BD707-D9CF-40AE-B4C6-C98DA3205C09}" type="datetimeFigureOut">
               <a:rPr lang="en-US" smtClean="0"/>
               <a:pPr/>
-              <a:t>9/10/2024</a:t>
+              <a:t>12/16/2024</a:t>
             </a:fld>
             <a:endParaRPr lang="en-US"/>
           </a:p>
@@ -2491,7 +2491,7 @@
             <a:fld id="{1D8BD707-D9CF-40AE-B4C6-C98DA3205C09}" type="datetimeFigureOut">
               <a:rPr lang="en-US" smtClean="0"/>
               <a:pPr/>
-              <a:t>9/10/2024</a:t>
+              <a:t>12/16/2024</a:t>
             </a:fld>
             <a:endParaRPr lang="en-US"/>
           </a:p>
@@ -2699,7 +2699,7 @@
             <a:fld id="{1D8BD707-D9CF-40AE-B4C6-C98DA3205C09}" type="datetimeFigureOut">
               <a:rPr lang="en-US" smtClean="0"/>
               <a:pPr/>
-              <a:t>9/10/2024</a:t>
+              <a:t>12/16/2024</a:t>
             </a:fld>
             <a:endParaRPr lang="en-US"/>
           </a:p>
@@ -3442,7 +3442,7 @@
         </p:blipFill>
         <p:spPr bwMode="auto">
           <a:xfrm>
-            <a:off x="228600" y="1752600"/>
+            <a:off x="181765" y="1752600"/>
             <a:ext cx="8780470" cy="4724400"/>
           </a:xfrm>
           <a:prstGeom prst="rect">
@@ -3750,7 +3750,7 @@
         </p:blipFill>
         <p:spPr bwMode="auto">
           <a:xfrm>
-            <a:off x="457200" y="1524000"/>
+            <a:off x="312266" y="1660525"/>
             <a:ext cx="8519467" cy="4648200"/>
           </a:xfrm>
           <a:prstGeom prst="rect">

</xml_diff>